<commit_message>
Diesmal wirklich final (hoffentlich)
</commit_message>
<xml_diff>
--- a/Project Proposal.pptx
+++ b/Project Proposal.pptx
@@ -1020,7 +1020,15 @@
             </a:r>
             <a:r>
               <a:rPr lang="en-US" dirty="0"/>
-              <a:t> ich Ihnen gerne </a:t>
+              <a:t> ich gerne </a:t>
+            </a:r>
+            <a:r>
+              <a:rPr lang="en-US" dirty="0" err="1"/>
+              <a:t>beginnen</a:t>
+            </a:r>
+            <a:r>
+              <a:rPr lang="en-US" dirty="0"/>
+              <a:t> Ihnen </a:t>
             </a:r>
             <a:r>
               <a:rPr lang="en-US" dirty="0" err="1"/>
@@ -1064,7 +1072,7 @@
             </a:r>
             <a:r>
               <a:rPr lang="en-US" dirty="0" err="1"/>
-              <a:t>welchen</a:t>
+              <a:t>welche</a:t>
             </a:r>
             <a:r>
               <a:rPr lang="en-US" dirty="0"/>
@@ -1072,7 +1080,7 @@
             </a:r>
             <a:r>
               <a:rPr lang="en-US" dirty="0" err="1"/>
-              <a:t>Zeitrahmen</a:t>
+              <a:t>Datenanalyse</a:t>
             </a:r>
             <a:r>
               <a:rPr lang="en-US" dirty="0"/>
@@ -1080,15 +1088,7 @@
             </a:r>
             <a:r>
               <a:rPr lang="en-US" dirty="0" err="1"/>
-              <a:t>wir</a:t>
-            </a:r>
-            <a:r>
-              <a:rPr lang="en-US" dirty="0"/>
-              <a:t> für die </a:t>
-            </a:r>
-            <a:r>
-              <a:rPr lang="en-US" dirty="0" err="1"/>
-              <a:t>einzelnen</a:t>
+              <a:t>Schritte</a:t>
             </a:r>
             <a:r>
               <a:rPr lang="en-US" dirty="0"/>
@@ -1096,17 +1096,76 @@
             </a:r>
             <a:r>
               <a:rPr lang="en-US" dirty="0" err="1"/>
-              <a:t>Datenanalyse</a:t>
+              <a:t>wir</a:t>
             </a:r>
             <a:r>
               <a:rPr lang="en-US" dirty="0"/>
               <a:t> </a:t>
             </a:r>
             <a:r>
-              <a:rPr lang="en-US"/>
-              <a:t>Schritte</a:t>
-            </a:r>
-            <a:endParaRPr lang="en-US" dirty="0"/>
+              <a:rPr lang="en-US" dirty="0" err="1"/>
+              <a:t>durchführen</a:t>
+            </a:r>
+            <a:r>
+              <a:rPr lang="en-US" dirty="0"/>
+              <a:t> </a:t>
+            </a:r>
+            <a:r>
+              <a:rPr lang="en-US" dirty="0" err="1"/>
+              <a:t>möchten</a:t>
+            </a:r>
+            <a:r>
+              <a:rPr lang="en-US" dirty="0"/>
+              <a:t> und </a:t>
+            </a:r>
+            <a:r>
+              <a:rPr lang="en-US" dirty="0" err="1"/>
+              <a:t>welchen</a:t>
+            </a:r>
+            <a:r>
+              <a:rPr lang="en-US" dirty="0"/>
+              <a:t> </a:t>
+            </a:r>
+            <a:r>
+              <a:rPr lang="en-US" dirty="0" err="1"/>
+              <a:t>Zeitrahmen</a:t>
+            </a:r>
+            <a:r>
+              <a:rPr lang="en-US" dirty="0"/>
+              <a:t> </a:t>
+            </a:r>
+            <a:r>
+              <a:rPr lang="en-US" dirty="0" err="1"/>
+              <a:t>wir</a:t>
+            </a:r>
+            <a:r>
+              <a:rPr lang="en-US" dirty="0"/>
+              <a:t> </a:t>
+            </a:r>
+            <a:r>
+              <a:rPr lang="en-US" dirty="0" err="1"/>
+              <a:t>dafür</a:t>
+            </a:r>
+            <a:r>
+              <a:rPr lang="en-US" dirty="0"/>
+              <a:t> </a:t>
+            </a:r>
+            <a:r>
+              <a:rPr lang="en-US" dirty="0" err="1"/>
+              <a:t>vorgesehen</a:t>
+            </a:r>
+            <a:r>
+              <a:rPr lang="en-US" dirty="0"/>
+              <a:t> </a:t>
+            </a:r>
+            <a:r>
+              <a:rPr lang="en-US" dirty="0" err="1"/>
+              <a:t>haben</a:t>
+            </a:r>
+            <a:r>
+              <a:rPr lang="en-US" dirty="0"/>
+              <a:t>.</a:t>
+            </a:r>
           </a:p>
         </p:txBody>
       </p:sp>
@@ -1147,6 +1206,1344 @@
 </file>
 
 <file path=ppt/notesSlides/notesSlide4.xml><?xml version="1.0" encoding="utf-8"?>
+<p:notes xmlns:a="http://schemas.openxmlformats.org/drawingml/2006/main" xmlns:r="http://schemas.openxmlformats.org/officeDocument/2006/relationships" xmlns:p="http://schemas.openxmlformats.org/presentationml/2006/main">
+  <p:cSld>
+    <p:spTree>
+      <p:nvGrpSpPr>
+        <p:cNvPr id="1" name=""/>
+        <p:cNvGrpSpPr/>
+        <p:nvPr/>
+      </p:nvGrpSpPr>
+      <p:grpSpPr>
+        <a:xfrm>
+          <a:off x="0" y="0"/>
+          <a:ext cx="0" cy="0"/>
+          <a:chOff x="0" y="0"/>
+          <a:chExt cx="0" cy="0"/>
+        </a:xfrm>
+      </p:grpSpPr>
+      <p:sp>
+        <p:nvSpPr>
+          <p:cNvPr id="2" name="Folienbildplatzhalter 1"/>
+          <p:cNvSpPr>
+            <a:spLocks noGrp="1" noRot="1" noChangeAspect="1"/>
+          </p:cNvSpPr>
+          <p:nvPr>
+            <p:ph type="sldImg"/>
+          </p:nvPr>
+        </p:nvSpPr>
+        <p:spPr/>
+      </p:sp>
+      <p:sp>
+        <p:nvSpPr>
+          <p:cNvPr id="3" name="Notizenplatzhalter 2"/>
+          <p:cNvSpPr>
+            <a:spLocks noGrp="1"/>
+          </p:cNvSpPr>
+          <p:nvPr>
+            <p:ph type="body" idx="1"/>
+          </p:nvPr>
+        </p:nvSpPr>
+        <p:spPr/>
+        <p:txBody>
+          <a:bodyPr/>
+          <a:lstStyle/>
+          <a:p>
+            <a:r>
+              <a:rPr lang="en-US" dirty="0"/>
+              <a:t>In der </a:t>
+            </a:r>
+            <a:r>
+              <a:rPr lang="en-US" dirty="0" err="1"/>
+              <a:t>ersten</a:t>
+            </a:r>
+            <a:r>
+              <a:rPr lang="en-US" dirty="0"/>
+              <a:t> </a:t>
+            </a:r>
+            <a:r>
+              <a:rPr lang="en-US" dirty="0" err="1"/>
+              <a:t>Woche</a:t>
+            </a:r>
+            <a:r>
+              <a:rPr lang="en-US" dirty="0"/>
+              <a:t> </a:t>
+            </a:r>
+            <a:r>
+              <a:rPr lang="en-US" dirty="0" err="1"/>
+              <a:t>vom</a:t>
+            </a:r>
+            <a:r>
+              <a:rPr lang="en-US" dirty="0"/>
+              <a:t> 19.-25.05. </a:t>
+            </a:r>
+            <a:r>
+              <a:rPr lang="en-US" dirty="0" err="1"/>
+              <a:t>werden</a:t>
+            </a:r>
+            <a:r>
+              <a:rPr lang="en-US" dirty="0"/>
+              <a:t> </a:t>
+            </a:r>
+            <a:r>
+              <a:rPr lang="en-US" dirty="0" err="1"/>
+              <a:t>wir</a:t>
+            </a:r>
+            <a:r>
+              <a:rPr lang="en-US" dirty="0"/>
+              <a:t> und </a:t>
+            </a:r>
+            <a:r>
+              <a:rPr lang="en-US" dirty="0" err="1"/>
+              <a:t>mit</a:t>
+            </a:r>
+            <a:r>
+              <a:rPr lang="en-US" dirty="0"/>
+              <a:t> der </a:t>
+            </a:r>
+            <a:r>
+              <a:rPr lang="en-US" dirty="0" err="1"/>
+              <a:t>der</a:t>
+            </a:r>
+            <a:r>
+              <a:rPr lang="en-US" dirty="0"/>
+              <a:t> </a:t>
+            </a:r>
+            <a:r>
+              <a:rPr lang="en-US" dirty="0" err="1"/>
+              <a:t>Beschreibung</a:t>
+            </a:r>
+            <a:r>
+              <a:rPr lang="en-US" dirty="0"/>
+              <a:t> und </a:t>
+            </a:r>
+            <a:r>
+              <a:rPr lang="en-US" dirty="0" err="1"/>
+              <a:t>Aufreinigung</a:t>
+            </a:r>
+            <a:r>
+              <a:rPr lang="en-US" dirty="0"/>
+              <a:t> </a:t>
+            </a:r>
+            <a:r>
+              <a:rPr lang="en-US" dirty="0" err="1"/>
+              <a:t>unserer</a:t>
+            </a:r>
+            <a:r>
+              <a:rPr lang="en-US" dirty="0"/>
+              <a:t> Daten </a:t>
+            </a:r>
+            <a:r>
+              <a:rPr lang="en-US" dirty="0" err="1"/>
+              <a:t>beschäftigen</a:t>
+            </a:r>
+            <a:r>
+              <a:rPr lang="en-US" dirty="0"/>
+              <a:t>. Dabei </a:t>
+            </a:r>
+            <a:r>
+              <a:rPr lang="en-US" dirty="0" err="1"/>
+              <a:t>möchten</a:t>
+            </a:r>
+            <a:r>
+              <a:rPr lang="en-US" dirty="0"/>
+              <a:t> </a:t>
+            </a:r>
+            <a:r>
+              <a:rPr lang="en-US" dirty="0" err="1"/>
+              <a:t>wir</a:t>
+            </a:r>
+            <a:r>
+              <a:rPr lang="en-US" dirty="0"/>
+              <a:t> </a:t>
+            </a:r>
+            <a:r>
+              <a:rPr lang="en-US" dirty="0" err="1"/>
+              <a:t>unsere</a:t>
+            </a:r>
+            <a:r>
+              <a:rPr lang="en-US" dirty="0"/>
+              <a:t> Daten neu </a:t>
+            </a:r>
+            <a:r>
+              <a:rPr lang="en-US" dirty="0" err="1"/>
+              <a:t>sortieren</a:t>
+            </a:r>
+            <a:r>
+              <a:rPr lang="en-US" dirty="0"/>
+              <a:t>, um den Proben </a:t>
+            </a:r>
+            <a:r>
+              <a:rPr lang="en-US" dirty="0" err="1"/>
+              <a:t>eindeutig</a:t>
+            </a:r>
+            <a:r>
+              <a:rPr lang="en-US" dirty="0"/>
+              <a:t> die </a:t>
+            </a:r>
+            <a:r>
+              <a:rPr lang="en-US" dirty="0" err="1"/>
+              <a:t>richtigen</a:t>
+            </a:r>
+            <a:r>
+              <a:rPr lang="en-US" dirty="0"/>
+              <a:t> </a:t>
+            </a:r>
+            <a:r>
+              <a:rPr lang="en-US" dirty="0" err="1"/>
+              <a:t>Fraktionen</a:t>
+            </a:r>
+            <a:r>
+              <a:rPr lang="en-US" dirty="0"/>
+              <a:t> </a:t>
+            </a:r>
+            <a:r>
+              <a:rPr lang="en-US" dirty="0" err="1"/>
+              <a:t>zuordnen</a:t>
+            </a:r>
+            <a:r>
+              <a:rPr lang="en-US" dirty="0"/>
+              <a:t> </a:t>
+            </a:r>
+            <a:r>
+              <a:rPr lang="en-US" dirty="0" err="1"/>
+              <a:t>zu</a:t>
+            </a:r>
+            <a:r>
+              <a:rPr lang="en-US" dirty="0"/>
+              <a:t> </a:t>
+            </a:r>
+            <a:r>
+              <a:rPr lang="en-US" dirty="0" err="1"/>
+              <a:t>können</a:t>
+            </a:r>
+            <a:r>
+              <a:rPr lang="en-US" dirty="0"/>
+              <a:t> und </a:t>
+            </a:r>
+            <a:r>
+              <a:rPr lang="en-US" dirty="0" err="1"/>
+              <a:t>sie</a:t>
+            </a:r>
+            <a:r>
+              <a:rPr lang="en-US" dirty="0"/>
+              <a:t> in </a:t>
+            </a:r>
+            <a:r>
+              <a:rPr lang="en-US" dirty="0" err="1"/>
+              <a:t>ein</a:t>
+            </a:r>
+            <a:r>
+              <a:rPr lang="en-US" dirty="0"/>
+              <a:t> </a:t>
+            </a:r>
+            <a:r>
+              <a:rPr lang="en-US" dirty="0" err="1"/>
+              <a:t>richtiges</a:t>
+            </a:r>
+            <a:r>
+              <a:rPr lang="en-US" dirty="0"/>
+              <a:t> Format (</a:t>
+            </a:r>
+            <a:r>
+              <a:rPr lang="en-US" dirty="0" err="1"/>
+              <a:t>numerics</a:t>
+            </a:r>
+            <a:r>
+              <a:rPr lang="en-US" dirty="0"/>
+              <a:t>) </a:t>
+            </a:r>
+            <a:r>
+              <a:rPr lang="en-US" dirty="0" err="1"/>
+              <a:t>überführen</a:t>
+            </a:r>
+            <a:r>
+              <a:rPr lang="en-US" dirty="0"/>
+              <a:t>. </a:t>
+            </a:r>
+            <a:r>
+              <a:rPr lang="en-US" dirty="0" err="1"/>
+              <a:t>Weiterhin</a:t>
+            </a:r>
+            <a:r>
+              <a:rPr lang="en-US" dirty="0"/>
+              <a:t> </a:t>
+            </a:r>
+            <a:r>
+              <a:rPr lang="en-US" dirty="0" err="1"/>
+              <a:t>möchten</a:t>
+            </a:r>
+            <a:r>
+              <a:rPr lang="en-US" dirty="0"/>
+              <a:t> </a:t>
+            </a:r>
+            <a:r>
+              <a:rPr lang="en-US" dirty="0" err="1"/>
+              <a:t>wir</a:t>
+            </a:r>
+            <a:r>
+              <a:rPr lang="en-US" dirty="0"/>
+              <a:t> </a:t>
+            </a:r>
+            <a:r>
+              <a:rPr lang="en-US" dirty="0" err="1"/>
+              <a:t>Reihen</a:t>
+            </a:r>
+            <a:r>
+              <a:rPr lang="en-US" dirty="0"/>
+              <a:t> </a:t>
+            </a:r>
+            <a:r>
+              <a:rPr lang="en-US" dirty="0" err="1"/>
+              <a:t>entfernen</a:t>
+            </a:r>
+            <a:r>
+              <a:rPr lang="en-US" dirty="0"/>
+              <a:t>, die </a:t>
+            </a:r>
+            <a:r>
+              <a:rPr lang="en-US" dirty="0" err="1"/>
+              <a:t>keine</a:t>
+            </a:r>
+            <a:r>
+              <a:rPr lang="en-US" dirty="0"/>
+              <a:t> </a:t>
+            </a:r>
+            <a:r>
+              <a:rPr lang="en-US" dirty="0" err="1"/>
+              <a:t>signifikanten</a:t>
+            </a:r>
+            <a:r>
+              <a:rPr lang="en-US" dirty="0"/>
+              <a:t> Daten, </a:t>
+            </a:r>
+            <a:r>
+              <a:rPr lang="en-US" dirty="0" err="1"/>
+              <a:t>beziehungsweise</a:t>
+            </a:r>
+            <a:r>
+              <a:rPr lang="en-US" dirty="0"/>
+              <a:t> </a:t>
+            </a:r>
+            <a:r>
+              <a:rPr lang="en-US" dirty="0" err="1"/>
+              <a:t>Abweichungen</a:t>
+            </a:r>
+            <a:r>
+              <a:rPr lang="en-US" dirty="0"/>
+              <a:t> von Null </a:t>
+            </a:r>
+            <a:r>
+              <a:rPr lang="en-US" dirty="0" err="1"/>
+              <a:t>zeigen</a:t>
+            </a:r>
+            <a:r>
+              <a:rPr lang="en-US" dirty="0"/>
+              <a:t>. Auch </a:t>
+            </a:r>
+            <a:r>
+              <a:rPr lang="en-US" dirty="0" err="1"/>
+              <a:t>nicht</a:t>
+            </a:r>
+            <a:r>
+              <a:rPr lang="en-US" dirty="0"/>
+              <a:t> </a:t>
+            </a:r>
+            <a:r>
+              <a:rPr lang="en-US" dirty="0" err="1"/>
+              <a:t>vorhandene</a:t>
+            </a:r>
+            <a:r>
+              <a:rPr lang="en-US" dirty="0"/>
+              <a:t> </a:t>
+            </a:r>
+            <a:r>
+              <a:rPr lang="en-US" dirty="0" err="1"/>
+              <a:t>Werte</a:t>
+            </a:r>
+            <a:r>
+              <a:rPr lang="en-US" dirty="0"/>
+              <a:t> </a:t>
+            </a:r>
+            <a:r>
+              <a:rPr lang="en-US" dirty="0" err="1"/>
+              <a:t>würden</a:t>
+            </a:r>
+            <a:r>
+              <a:rPr lang="en-US" dirty="0"/>
+              <a:t> </a:t>
+            </a:r>
+            <a:r>
+              <a:rPr lang="en-US" dirty="0" err="1"/>
+              <a:t>entfernt</a:t>
+            </a:r>
+            <a:r>
+              <a:rPr lang="en-US" dirty="0"/>
+              <a:t> </a:t>
+            </a:r>
+            <a:r>
+              <a:rPr lang="en-US" dirty="0" err="1"/>
+              <a:t>oder</a:t>
+            </a:r>
+            <a:r>
+              <a:rPr lang="en-US" dirty="0"/>
+              <a:t> </a:t>
+            </a:r>
+            <a:r>
+              <a:rPr lang="en-US" dirty="0" err="1"/>
+              <a:t>ersetzt</a:t>
+            </a:r>
+            <a:r>
+              <a:rPr lang="en-US" dirty="0"/>
+              <a:t> </a:t>
+            </a:r>
+            <a:r>
+              <a:rPr lang="en-US" dirty="0" err="1"/>
+              <a:t>werden</a:t>
+            </a:r>
+            <a:r>
+              <a:rPr lang="en-US" dirty="0"/>
+              <a:t>. </a:t>
+            </a:r>
+            <a:r>
+              <a:rPr lang="en-US" dirty="0" err="1"/>
+              <a:t>Außerdem</a:t>
+            </a:r>
+            <a:r>
+              <a:rPr lang="en-US" dirty="0"/>
+              <a:t> </a:t>
+            </a:r>
+            <a:r>
+              <a:rPr lang="en-US" dirty="0" err="1"/>
+              <a:t>möchten</a:t>
+            </a:r>
+            <a:r>
+              <a:rPr lang="en-US" dirty="0"/>
+              <a:t> </a:t>
+            </a:r>
+            <a:r>
+              <a:rPr lang="en-US" dirty="0" err="1"/>
+              <a:t>wir</a:t>
+            </a:r>
+            <a:r>
+              <a:rPr lang="en-US" dirty="0"/>
+              <a:t> </a:t>
+            </a:r>
+            <a:r>
+              <a:rPr lang="en-US" dirty="0" err="1"/>
+              <a:t>eventuelle</a:t>
+            </a:r>
+            <a:r>
+              <a:rPr lang="en-US" dirty="0"/>
+              <a:t> </a:t>
+            </a:r>
+            <a:r>
+              <a:rPr lang="en-US" dirty="0" err="1"/>
+              <a:t>Ausreißer</a:t>
+            </a:r>
+            <a:r>
+              <a:rPr lang="en-US" dirty="0"/>
+              <a:t> </a:t>
+            </a:r>
+            <a:r>
+              <a:rPr lang="en-US" dirty="0" err="1"/>
+              <a:t>aussortieren</a:t>
+            </a:r>
+            <a:r>
+              <a:rPr lang="en-US" dirty="0"/>
+              <a:t>, </a:t>
+            </a:r>
+            <a:r>
+              <a:rPr lang="en-US" dirty="0" err="1"/>
+              <a:t>wenn</a:t>
+            </a:r>
+            <a:r>
+              <a:rPr lang="en-US" dirty="0"/>
+              <a:t> </a:t>
+            </a:r>
+            <a:r>
+              <a:rPr lang="en-US" dirty="0" err="1"/>
+              <a:t>sie</a:t>
+            </a:r>
+            <a:r>
+              <a:rPr lang="en-US" dirty="0"/>
+              <a:t> </a:t>
+            </a:r>
+            <a:r>
+              <a:rPr lang="en-US" dirty="0" err="1"/>
+              <a:t>technischen</a:t>
+            </a:r>
+            <a:r>
+              <a:rPr lang="en-US" dirty="0"/>
+              <a:t> </a:t>
+            </a:r>
+            <a:r>
+              <a:rPr lang="en-US" dirty="0" err="1"/>
+              <a:t>Ursprungs</a:t>
+            </a:r>
+            <a:r>
+              <a:rPr lang="en-US" dirty="0"/>
+              <a:t> </a:t>
+            </a:r>
+            <a:r>
+              <a:rPr lang="en-US" dirty="0" err="1"/>
+              <a:t>sind</a:t>
+            </a:r>
+            <a:r>
+              <a:rPr lang="en-US" dirty="0"/>
+              <a:t>. Das </a:t>
+            </a:r>
+            <a:r>
+              <a:rPr lang="en-US" dirty="0" err="1"/>
+              <a:t>allgemeine</a:t>
+            </a:r>
+            <a:r>
+              <a:rPr lang="en-US" dirty="0"/>
+              <a:t> </a:t>
+            </a:r>
+            <a:r>
+              <a:rPr lang="en-US" dirty="0" err="1"/>
+              <a:t>Grundprinzip</a:t>
+            </a:r>
+            <a:r>
+              <a:rPr lang="en-US" dirty="0"/>
+              <a:t> </a:t>
+            </a:r>
+            <a:r>
+              <a:rPr lang="en-US" dirty="0" err="1"/>
+              <a:t>eines</a:t>
+            </a:r>
+            <a:r>
+              <a:rPr lang="en-US" dirty="0"/>
+              <a:t> </a:t>
+            </a:r>
+            <a:r>
+              <a:rPr lang="en-US" dirty="0" err="1"/>
+              <a:t>Ausreißers</a:t>
+            </a:r>
+            <a:r>
+              <a:rPr lang="en-US" dirty="0"/>
+              <a:t> </a:t>
+            </a:r>
+            <a:r>
+              <a:rPr lang="en-US" dirty="0" err="1"/>
+              <a:t>ist</a:t>
+            </a:r>
+            <a:r>
+              <a:rPr lang="en-US" dirty="0"/>
+              <a:t> </a:t>
+            </a:r>
+            <a:r>
+              <a:rPr lang="en-US" dirty="0" err="1"/>
+              <a:t>hier</a:t>
+            </a:r>
+            <a:r>
+              <a:rPr lang="en-US" dirty="0"/>
+              <a:t> </a:t>
+            </a:r>
+            <a:r>
+              <a:rPr lang="en-US" dirty="0" err="1"/>
+              <a:t>dargestellt</a:t>
+            </a:r>
+            <a:r>
+              <a:rPr lang="en-US" dirty="0"/>
+              <a:t>. Dabei </a:t>
+            </a:r>
+            <a:r>
+              <a:rPr lang="en-US" dirty="0" err="1"/>
+              <a:t>zeigt</a:t>
+            </a:r>
+            <a:r>
+              <a:rPr lang="en-US" dirty="0"/>
+              <a:t> der </a:t>
+            </a:r>
+            <a:r>
+              <a:rPr lang="en-US" dirty="0" err="1"/>
+              <a:t>Datenpunkt</a:t>
+            </a:r>
+            <a:r>
+              <a:rPr lang="en-US" dirty="0"/>
+              <a:t> </a:t>
+            </a:r>
+            <a:r>
+              <a:rPr lang="en-US" dirty="0" err="1"/>
+              <a:t>im</a:t>
+            </a:r>
+            <a:r>
+              <a:rPr lang="en-US" dirty="0"/>
+              <a:t> </a:t>
+            </a:r>
+            <a:r>
+              <a:rPr lang="en-US" dirty="0" err="1"/>
+              <a:t>roten</a:t>
+            </a:r>
+            <a:r>
+              <a:rPr lang="en-US" dirty="0"/>
+              <a:t> Kreis </a:t>
+            </a:r>
+            <a:r>
+              <a:rPr lang="en-US" dirty="0" err="1"/>
+              <a:t>signifikant</a:t>
+            </a:r>
+            <a:r>
+              <a:rPr lang="en-US" dirty="0"/>
+              <a:t> </a:t>
+            </a:r>
+            <a:r>
+              <a:rPr lang="en-US" dirty="0" err="1"/>
+              <a:t>erhöhte</a:t>
+            </a:r>
+            <a:r>
+              <a:rPr lang="en-US" dirty="0"/>
+              <a:t> </a:t>
+            </a:r>
+            <a:r>
+              <a:rPr lang="en-US" dirty="0" err="1"/>
+              <a:t>Cholesterolwerte</a:t>
+            </a:r>
+            <a:r>
+              <a:rPr lang="en-US" dirty="0"/>
+              <a:t> </a:t>
+            </a:r>
+            <a:r>
+              <a:rPr lang="en-US" dirty="0" err="1"/>
+              <a:t>im</a:t>
+            </a:r>
+            <a:r>
+              <a:rPr lang="en-US" dirty="0"/>
+              <a:t> </a:t>
+            </a:r>
+            <a:r>
+              <a:rPr lang="en-US" dirty="0" err="1"/>
+              <a:t>Vergleich</a:t>
+            </a:r>
+            <a:r>
+              <a:rPr lang="en-US" dirty="0"/>
+              <a:t> </a:t>
+            </a:r>
+            <a:r>
+              <a:rPr lang="en-US" dirty="0" err="1"/>
+              <a:t>zu</a:t>
+            </a:r>
+            <a:r>
+              <a:rPr lang="en-US" dirty="0"/>
+              <a:t> </a:t>
+            </a:r>
+            <a:r>
+              <a:rPr lang="en-US" dirty="0" err="1"/>
+              <a:t>anderen</a:t>
+            </a:r>
+            <a:r>
+              <a:rPr lang="en-US" dirty="0"/>
+              <a:t> </a:t>
+            </a:r>
+            <a:r>
+              <a:rPr lang="en-US" dirty="0" err="1"/>
+              <a:t>Werten</a:t>
+            </a:r>
+            <a:r>
+              <a:rPr lang="en-US" dirty="0"/>
+              <a:t> in der </a:t>
+            </a:r>
+            <a:r>
+              <a:rPr lang="en-US" dirty="0" err="1"/>
+              <a:t>gleichen</a:t>
+            </a:r>
+            <a:r>
+              <a:rPr lang="en-US" dirty="0"/>
+              <a:t> </a:t>
+            </a:r>
+            <a:r>
+              <a:rPr lang="en-US" dirty="0" err="1"/>
+              <a:t>Altersgruppe</a:t>
+            </a:r>
+            <a:r>
+              <a:rPr lang="en-US" dirty="0"/>
+              <a:t>. </a:t>
+            </a:r>
+            <a:r>
+              <a:rPr lang="en-US" dirty="0" err="1"/>
+              <a:t>Zuletzt</a:t>
+            </a:r>
+            <a:r>
+              <a:rPr lang="en-US" dirty="0"/>
+              <a:t> </a:t>
+            </a:r>
+            <a:r>
+              <a:rPr lang="en-US" dirty="0" err="1"/>
+              <a:t>möchten</a:t>
+            </a:r>
+            <a:r>
+              <a:rPr lang="en-US" dirty="0"/>
+              <a:t> </a:t>
+            </a:r>
+            <a:r>
+              <a:rPr lang="en-US" dirty="0" err="1"/>
+              <a:t>wir</a:t>
+            </a:r>
+            <a:r>
+              <a:rPr lang="en-US" dirty="0"/>
+              <a:t> </a:t>
+            </a:r>
+            <a:r>
+              <a:rPr lang="en-US" dirty="0" err="1"/>
+              <a:t>als</a:t>
+            </a:r>
+            <a:r>
+              <a:rPr lang="en-US" dirty="0"/>
+              <a:t> Teil der </a:t>
+            </a:r>
+            <a:r>
+              <a:rPr lang="en-US" dirty="0" err="1"/>
+              <a:t>Datenaufreinigung</a:t>
+            </a:r>
+            <a:r>
+              <a:rPr lang="en-US" dirty="0"/>
+              <a:t> </a:t>
+            </a:r>
+            <a:r>
+              <a:rPr lang="en-US" dirty="0" err="1"/>
+              <a:t>unsere</a:t>
+            </a:r>
+            <a:r>
+              <a:rPr lang="en-US" dirty="0"/>
+              <a:t> Daten für </a:t>
+            </a:r>
+            <a:r>
+              <a:rPr lang="en-US" dirty="0" err="1"/>
+              <a:t>bessere</a:t>
+            </a:r>
+            <a:r>
+              <a:rPr lang="en-US" dirty="0"/>
+              <a:t> </a:t>
+            </a:r>
+            <a:r>
+              <a:rPr lang="en-US" dirty="0" err="1"/>
+              <a:t>Vergleichbarkeit</a:t>
+            </a:r>
+            <a:r>
+              <a:rPr lang="en-US" dirty="0"/>
+              <a:t> </a:t>
+            </a:r>
+            <a:r>
+              <a:rPr lang="en-US" dirty="0" err="1"/>
+              <a:t>zwischen</a:t>
+            </a:r>
+            <a:r>
+              <a:rPr lang="en-US" dirty="0"/>
+              <a:t> den Proben </a:t>
+            </a:r>
+            <a:r>
+              <a:rPr lang="en-US" dirty="0" err="1"/>
+              <a:t>normalisieren</a:t>
+            </a:r>
+            <a:r>
+              <a:rPr lang="en-US" dirty="0"/>
+              <a:t>.</a:t>
+            </a:r>
+          </a:p>
+        </p:txBody>
+      </p:sp>
+      <p:sp>
+        <p:nvSpPr>
+          <p:cNvPr id="4" name="Foliennummernplatzhalter 3"/>
+          <p:cNvSpPr>
+            <a:spLocks noGrp="1"/>
+          </p:cNvSpPr>
+          <p:nvPr>
+            <p:ph type="sldNum" sz="quarter" idx="5"/>
+          </p:nvPr>
+        </p:nvSpPr>
+        <p:spPr/>
+        <p:txBody>
+          <a:bodyPr/>
+          <a:lstStyle/>
+          <a:p>
+            <a:fld id="{5CE5EABD-9B00-4D4A-AB75-54D2757912B9}" type="slidenum">
+              <a:rPr lang="de-DE" smtClean="0"/>
+              <a:t>7</a:t>
+            </a:fld>
+            <a:endParaRPr lang="de-DE"/>
+          </a:p>
+        </p:txBody>
+      </p:sp>
+    </p:spTree>
+    <p:extLst>
+      <p:ext uri="{BB962C8B-B14F-4D97-AF65-F5344CB8AC3E}">
+        <p14:creationId xmlns:p14="http://schemas.microsoft.com/office/powerpoint/2010/main" val="2971346601"/>
+      </p:ext>
+    </p:extLst>
+  </p:cSld>
+  <p:clrMapOvr>
+    <a:masterClrMapping/>
+  </p:clrMapOvr>
+</p:notes>
+</file>
+
+<file path=ppt/notesSlides/notesSlide5.xml><?xml version="1.0" encoding="utf-8"?>
+<p:notes xmlns:a="http://schemas.openxmlformats.org/drawingml/2006/main" xmlns:r="http://schemas.openxmlformats.org/officeDocument/2006/relationships" xmlns:p="http://schemas.openxmlformats.org/presentationml/2006/main">
+  <p:cSld>
+    <p:spTree>
+      <p:nvGrpSpPr>
+        <p:cNvPr id="1" name=""/>
+        <p:cNvGrpSpPr/>
+        <p:nvPr/>
+      </p:nvGrpSpPr>
+      <p:grpSpPr>
+        <a:xfrm>
+          <a:off x="0" y="0"/>
+          <a:ext cx="0" cy="0"/>
+          <a:chOff x="0" y="0"/>
+          <a:chExt cx="0" cy="0"/>
+        </a:xfrm>
+      </p:grpSpPr>
+      <p:sp>
+        <p:nvSpPr>
+          <p:cNvPr id="2" name="Folienbildplatzhalter 1"/>
+          <p:cNvSpPr>
+            <a:spLocks noGrp="1" noRot="1" noChangeAspect="1"/>
+          </p:cNvSpPr>
+          <p:nvPr>
+            <p:ph type="sldImg"/>
+          </p:nvPr>
+        </p:nvSpPr>
+        <p:spPr/>
+      </p:sp>
+      <p:sp>
+        <p:nvSpPr>
+          <p:cNvPr id="3" name="Notizenplatzhalter 2"/>
+          <p:cNvSpPr>
+            <a:spLocks noGrp="1"/>
+          </p:cNvSpPr>
+          <p:nvPr>
+            <p:ph type="body" idx="1"/>
+          </p:nvPr>
+        </p:nvSpPr>
+        <p:spPr/>
+        <p:txBody>
+          <a:bodyPr/>
+          <a:lstStyle/>
+          <a:p>
+            <a:r>
+              <a:rPr lang="en-US" dirty="0" err="1"/>
+              <a:t>Nachdem</a:t>
+            </a:r>
+            <a:r>
+              <a:rPr lang="en-US" dirty="0"/>
+              <a:t> </a:t>
+            </a:r>
+            <a:r>
+              <a:rPr lang="en-US" dirty="0" err="1"/>
+              <a:t>wir</a:t>
+            </a:r>
+            <a:r>
+              <a:rPr lang="en-US" dirty="0"/>
+              <a:t> </a:t>
+            </a:r>
+            <a:r>
+              <a:rPr lang="en-US" dirty="0" err="1"/>
+              <a:t>unsere</a:t>
+            </a:r>
+            <a:r>
+              <a:rPr lang="en-US" dirty="0"/>
+              <a:t> Daten </a:t>
+            </a:r>
+            <a:r>
+              <a:rPr lang="en-US" dirty="0" err="1"/>
+              <a:t>bereinigt</a:t>
+            </a:r>
+            <a:r>
+              <a:rPr lang="en-US" dirty="0"/>
+              <a:t> </a:t>
+            </a:r>
+            <a:r>
+              <a:rPr lang="en-US" dirty="0" err="1"/>
+              <a:t>haben</a:t>
+            </a:r>
+            <a:r>
+              <a:rPr lang="en-US" dirty="0"/>
+              <a:t>, </a:t>
+            </a:r>
+            <a:r>
+              <a:rPr lang="en-US" dirty="0" err="1"/>
+              <a:t>möchten</a:t>
+            </a:r>
+            <a:r>
+              <a:rPr lang="en-US" dirty="0"/>
+              <a:t> </a:t>
+            </a:r>
+            <a:r>
+              <a:rPr lang="en-US" dirty="0" err="1"/>
+              <a:t>wir</a:t>
+            </a:r>
+            <a:r>
+              <a:rPr lang="en-US" dirty="0"/>
+              <a:t> </a:t>
+            </a:r>
+            <a:r>
+              <a:rPr lang="en-US" dirty="0" err="1"/>
+              <a:t>diese</a:t>
+            </a:r>
+            <a:r>
+              <a:rPr lang="en-US" dirty="0"/>
+              <a:t> in der </a:t>
+            </a:r>
+            <a:r>
+              <a:rPr lang="en-US" dirty="0" err="1"/>
+              <a:t>zweiten</a:t>
+            </a:r>
+            <a:r>
+              <a:rPr lang="en-US" dirty="0"/>
+              <a:t> </a:t>
+            </a:r>
+            <a:r>
+              <a:rPr lang="en-US" dirty="0" err="1"/>
+              <a:t>Woche</a:t>
+            </a:r>
+            <a:r>
+              <a:rPr lang="en-US" dirty="0"/>
+              <a:t> </a:t>
+            </a:r>
+            <a:r>
+              <a:rPr lang="en-US" dirty="0" err="1"/>
+              <a:t>vom</a:t>
+            </a:r>
+            <a:r>
+              <a:rPr lang="en-US" dirty="0"/>
+              <a:t> 26.05. bis </a:t>
+            </a:r>
+            <a:r>
+              <a:rPr lang="en-US" dirty="0" err="1"/>
+              <a:t>zum</a:t>
+            </a:r>
+            <a:r>
+              <a:rPr lang="en-US" dirty="0"/>
+              <a:t> 01.06. </a:t>
+            </a:r>
+            <a:r>
+              <a:rPr lang="en-US" dirty="0" err="1"/>
+              <a:t>näher</a:t>
+            </a:r>
+            <a:r>
+              <a:rPr lang="en-US" dirty="0"/>
+              <a:t> </a:t>
+            </a:r>
+            <a:r>
+              <a:rPr lang="en-US" dirty="0" err="1"/>
+              <a:t>betrachten</a:t>
+            </a:r>
+            <a:r>
+              <a:rPr lang="en-US" dirty="0"/>
+              <a:t> und </a:t>
+            </a:r>
+            <a:r>
+              <a:rPr lang="en-US" dirty="0" err="1"/>
+              <a:t>ihre</a:t>
+            </a:r>
+            <a:r>
+              <a:rPr lang="en-US" dirty="0"/>
+              <a:t> </a:t>
+            </a:r>
+            <a:r>
+              <a:rPr lang="en-US" dirty="0" err="1"/>
+              <a:t>Struktur</a:t>
+            </a:r>
+            <a:r>
+              <a:rPr lang="en-US" dirty="0"/>
+              <a:t> verstehen. Wir </a:t>
+            </a:r>
+            <a:r>
+              <a:rPr lang="en-US" dirty="0" err="1"/>
+              <a:t>werden</a:t>
+            </a:r>
+            <a:r>
+              <a:rPr lang="en-US" dirty="0"/>
+              <a:t> </a:t>
+            </a:r>
+            <a:r>
+              <a:rPr lang="en-US" dirty="0" err="1"/>
+              <a:t>eine</a:t>
+            </a:r>
+            <a:r>
+              <a:rPr lang="en-US" dirty="0"/>
+              <a:t> </a:t>
+            </a:r>
+            <a:r>
+              <a:rPr lang="en-US" dirty="0" err="1"/>
+              <a:t>grundlegende</a:t>
+            </a:r>
+            <a:r>
+              <a:rPr lang="en-US" dirty="0"/>
+              <a:t> explorative </a:t>
+            </a:r>
+            <a:r>
+              <a:rPr lang="en-US" dirty="0" err="1"/>
+              <a:t>Datenanalyse</a:t>
+            </a:r>
+            <a:r>
+              <a:rPr lang="en-US" dirty="0"/>
+              <a:t> </a:t>
+            </a:r>
+            <a:r>
+              <a:rPr lang="en-US" dirty="0" err="1"/>
+              <a:t>durchführen</a:t>
+            </a:r>
+            <a:r>
+              <a:rPr lang="en-US" dirty="0"/>
+              <a:t>, </a:t>
+            </a:r>
+            <a:r>
+              <a:rPr lang="en-US" dirty="0" err="1"/>
+              <a:t>bei</a:t>
+            </a:r>
+            <a:r>
+              <a:rPr lang="en-US" dirty="0"/>
+              <a:t> der </a:t>
+            </a:r>
+            <a:r>
+              <a:rPr lang="en-US" dirty="0" err="1"/>
+              <a:t>wir</a:t>
+            </a:r>
+            <a:r>
+              <a:rPr lang="en-US" dirty="0"/>
+              <a:t> die </a:t>
+            </a:r>
+            <a:r>
+              <a:rPr lang="en-US" dirty="0" err="1"/>
+              <a:t>Verteilung</a:t>
+            </a:r>
+            <a:r>
+              <a:rPr lang="en-US" dirty="0"/>
+              <a:t> der </a:t>
+            </a:r>
+            <a:r>
+              <a:rPr lang="en-US" dirty="0" err="1"/>
+              <a:t>Gesamtdaten</a:t>
+            </a:r>
+            <a:r>
+              <a:rPr lang="en-US" dirty="0"/>
+              <a:t>, </a:t>
+            </a:r>
+            <a:r>
+              <a:rPr lang="en-US" dirty="0" err="1"/>
+              <a:t>einzelner</a:t>
+            </a:r>
+            <a:r>
+              <a:rPr lang="en-US" dirty="0"/>
+              <a:t> </a:t>
+            </a:r>
+            <a:r>
+              <a:rPr lang="en-US" dirty="0" err="1"/>
+              <a:t>Stichproben</a:t>
+            </a:r>
+            <a:r>
+              <a:rPr lang="en-US" dirty="0"/>
+              <a:t> und </a:t>
+            </a:r>
+            <a:r>
+              <a:rPr lang="en-US" dirty="0" err="1"/>
+              <a:t>Merkmale</a:t>
+            </a:r>
+            <a:r>
+              <a:rPr lang="en-US" dirty="0"/>
+              <a:t> </a:t>
+            </a:r>
+            <a:r>
+              <a:rPr lang="en-US" dirty="0" err="1"/>
+              <a:t>betrachten</a:t>
+            </a:r>
+            <a:r>
+              <a:rPr lang="en-US" dirty="0"/>
+              <a:t>. Dabei </a:t>
+            </a:r>
+            <a:r>
+              <a:rPr lang="en-US" dirty="0" err="1"/>
+              <a:t>werden</a:t>
+            </a:r>
+            <a:r>
+              <a:rPr lang="en-US" dirty="0"/>
+              <a:t> </a:t>
+            </a:r>
+            <a:r>
+              <a:rPr lang="en-US" dirty="0" err="1"/>
+              <a:t>wir</a:t>
+            </a:r>
+            <a:r>
+              <a:rPr lang="en-US" dirty="0"/>
+              <a:t> </a:t>
+            </a:r>
+            <a:r>
+              <a:rPr lang="en-US" dirty="0" err="1"/>
+              <a:t>beispielsweise</a:t>
+            </a:r>
+            <a:r>
+              <a:rPr lang="en-US" dirty="0"/>
+              <a:t> absolute und </a:t>
+            </a:r>
+            <a:r>
+              <a:rPr lang="en-US" dirty="0" err="1"/>
+              <a:t>lokale</a:t>
+            </a:r>
+            <a:r>
+              <a:rPr lang="en-US" dirty="0"/>
+              <a:t> Maxima in den </a:t>
+            </a:r>
+            <a:r>
+              <a:rPr lang="en-US" dirty="0" err="1"/>
+              <a:t>Proteinprofilen</a:t>
+            </a:r>
+            <a:r>
+              <a:rPr lang="en-US" dirty="0"/>
+              <a:t> </a:t>
+            </a:r>
+            <a:r>
+              <a:rPr lang="en-US" dirty="0" err="1"/>
+              <a:t>betrachten</a:t>
+            </a:r>
+            <a:r>
+              <a:rPr lang="en-US" dirty="0"/>
+              <a:t>. Wir </a:t>
+            </a:r>
+            <a:r>
+              <a:rPr lang="en-US" dirty="0" err="1"/>
+              <a:t>werden</a:t>
+            </a:r>
+            <a:r>
+              <a:rPr lang="en-US" dirty="0"/>
+              <a:t> </a:t>
+            </a:r>
+            <a:r>
+              <a:rPr lang="en-US" dirty="0" err="1"/>
+              <a:t>mit</a:t>
+            </a:r>
+            <a:r>
+              <a:rPr lang="en-US" dirty="0"/>
+              <a:t> </a:t>
+            </a:r>
+            <a:r>
+              <a:rPr lang="en-US" dirty="0" err="1"/>
+              <a:t>einem</a:t>
+            </a:r>
+            <a:r>
+              <a:rPr lang="en-US" dirty="0"/>
+              <a:t> t-test </a:t>
+            </a:r>
+            <a:r>
+              <a:rPr lang="en-US" dirty="0" err="1"/>
+              <a:t>überprüfen</a:t>
+            </a:r>
+            <a:r>
+              <a:rPr lang="en-US" dirty="0"/>
+              <a:t>, </a:t>
+            </a:r>
+            <a:r>
+              <a:rPr lang="en-US" dirty="0" err="1"/>
+              <a:t>ob</a:t>
+            </a:r>
+            <a:r>
+              <a:rPr lang="en-US" dirty="0"/>
+              <a:t> die Shifts </a:t>
+            </a:r>
+            <a:r>
+              <a:rPr lang="en-US" dirty="0" err="1"/>
+              <a:t>signifikant</a:t>
+            </a:r>
+            <a:r>
+              <a:rPr lang="en-US" dirty="0"/>
+              <a:t> </a:t>
+            </a:r>
+            <a:r>
+              <a:rPr lang="en-US" dirty="0" err="1"/>
+              <a:t>sind</a:t>
+            </a:r>
+            <a:r>
+              <a:rPr lang="en-US" dirty="0"/>
+              <a:t> und </a:t>
+            </a:r>
+            <a:r>
+              <a:rPr lang="en-US" dirty="0" err="1"/>
+              <a:t>mithilfe</a:t>
+            </a:r>
+            <a:r>
+              <a:rPr lang="en-US" dirty="0"/>
+              <a:t> </a:t>
+            </a:r>
+            <a:r>
+              <a:rPr lang="en-US" dirty="0" err="1"/>
+              <a:t>eines</a:t>
+            </a:r>
+            <a:r>
+              <a:rPr lang="en-US" dirty="0"/>
+              <a:t> proportion tests </a:t>
+            </a:r>
+            <a:r>
+              <a:rPr lang="en-US" dirty="0" err="1"/>
+              <a:t>schauen</a:t>
+            </a:r>
+            <a:r>
+              <a:rPr lang="en-US" dirty="0"/>
+              <a:t>, </a:t>
+            </a:r>
+            <a:r>
+              <a:rPr lang="en-US" dirty="0" err="1"/>
+              <a:t>ob</a:t>
+            </a:r>
+            <a:r>
+              <a:rPr lang="en-US" dirty="0"/>
+              <a:t> </a:t>
+            </a:r>
+            <a:r>
+              <a:rPr lang="en-US" dirty="0" err="1"/>
+              <a:t>unsere</a:t>
+            </a:r>
+            <a:r>
+              <a:rPr lang="en-US" dirty="0"/>
+              <a:t> </a:t>
+            </a:r>
+            <a:r>
+              <a:rPr lang="en-US" dirty="0" err="1"/>
+              <a:t>Werte</a:t>
+            </a:r>
+            <a:r>
+              <a:rPr lang="en-US" dirty="0"/>
+              <a:t> den </a:t>
+            </a:r>
+            <a:r>
+              <a:rPr lang="en-US" dirty="0" err="1"/>
+              <a:t>wahren</a:t>
+            </a:r>
+            <a:r>
+              <a:rPr lang="en-US" dirty="0"/>
+              <a:t> </a:t>
+            </a:r>
+            <a:r>
+              <a:rPr lang="en-US" dirty="0" err="1"/>
+              <a:t>Anteil</a:t>
+            </a:r>
+            <a:r>
+              <a:rPr lang="en-US" dirty="0"/>
+              <a:t> der </a:t>
+            </a:r>
+            <a:r>
+              <a:rPr lang="en-US" dirty="0" err="1"/>
+              <a:t>Gesamtproteine</a:t>
+            </a:r>
+            <a:r>
+              <a:rPr lang="en-US" dirty="0"/>
+              <a:t> </a:t>
+            </a:r>
+            <a:r>
+              <a:rPr lang="en-US" dirty="0" err="1"/>
+              <a:t>darstellen</a:t>
+            </a:r>
+            <a:r>
+              <a:rPr lang="en-US" dirty="0"/>
+              <a:t>. </a:t>
+            </a:r>
+            <a:r>
+              <a:rPr lang="en-US" dirty="0" err="1"/>
+              <a:t>Weiterhin</a:t>
+            </a:r>
+            <a:r>
+              <a:rPr lang="en-US" dirty="0"/>
+              <a:t> </a:t>
+            </a:r>
+            <a:r>
+              <a:rPr lang="en-US" dirty="0" err="1"/>
+              <a:t>werden</a:t>
+            </a:r>
+            <a:r>
+              <a:rPr lang="en-US" dirty="0"/>
+              <a:t> </a:t>
+            </a:r>
+            <a:r>
+              <a:rPr lang="en-US" dirty="0" err="1"/>
+              <a:t>wird</a:t>
+            </a:r>
+            <a:r>
+              <a:rPr lang="en-US" dirty="0"/>
+              <a:t> </a:t>
+            </a:r>
+            <a:r>
+              <a:rPr lang="en-US" dirty="0" err="1"/>
+              <a:t>unsere</a:t>
+            </a:r>
+            <a:r>
+              <a:rPr lang="en-US" dirty="0"/>
+              <a:t> Daten </a:t>
+            </a:r>
+            <a:r>
+              <a:rPr lang="en-US" dirty="0" err="1"/>
+              <a:t>visualisieren</a:t>
+            </a:r>
+            <a:r>
+              <a:rPr lang="en-US" dirty="0"/>
+              <a:t> und </a:t>
+            </a:r>
+            <a:r>
+              <a:rPr lang="en-US" dirty="0" err="1"/>
+              <a:t>erste</a:t>
+            </a:r>
+            <a:r>
+              <a:rPr lang="en-US" dirty="0"/>
+              <a:t> </a:t>
+            </a:r>
+            <a:r>
+              <a:rPr lang="en-US" dirty="0" err="1"/>
+              <a:t>Hypothesen</a:t>
+            </a:r>
+            <a:r>
+              <a:rPr lang="en-US" dirty="0"/>
+              <a:t> </a:t>
+            </a:r>
+            <a:r>
+              <a:rPr lang="en-US" dirty="0" err="1"/>
+              <a:t>überprüfen</a:t>
+            </a:r>
+            <a:r>
+              <a:rPr lang="en-US" dirty="0"/>
+              <a:t>.</a:t>
+            </a:r>
+          </a:p>
+        </p:txBody>
+      </p:sp>
+      <p:sp>
+        <p:nvSpPr>
+          <p:cNvPr id="4" name="Foliennummernplatzhalter 3"/>
+          <p:cNvSpPr>
+            <a:spLocks noGrp="1"/>
+          </p:cNvSpPr>
+          <p:nvPr>
+            <p:ph type="sldNum" sz="quarter" idx="5"/>
+          </p:nvPr>
+        </p:nvSpPr>
+        <p:spPr/>
+        <p:txBody>
+          <a:bodyPr/>
+          <a:lstStyle/>
+          <a:p>
+            <a:fld id="{5CE5EABD-9B00-4D4A-AB75-54D2757912B9}" type="slidenum">
+              <a:rPr lang="de-DE" smtClean="0"/>
+              <a:t>8</a:t>
+            </a:fld>
+            <a:endParaRPr lang="de-DE"/>
+          </a:p>
+        </p:txBody>
+      </p:sp>
+    </p:spTree>
+    <p:extLst>
+      <p:ext uri="{BB962C8B-B14F-4D97-AF65-F5344CB8AC3E}">
+        <p14:creationId xmlns:p14="http://schemas.microsoft.com/office/powerpoint/2010/main" val="2721610578"/>
+      </p:ext>
+    </p:extLst>
+  </p:cSld>
+  <p:clrMapOvr>
+    <a:masterClrMapping/>
+  </p:clrMapOvr>
+</p:notes>
+</file>
+
+<file path=ppt/notesSlides/notesSlide6.xml><?xml version="1.0" encoding="utf-8"?>
 <p:notes xmlns:a="http://schemas.openxmlformats.org/drawingml/2006/main" xmlns:r="http://schemas.openxmlformats.org/officeDocument/2006/relationships" xmlns:p="http://schemas.openxmlformats.org/presentationml/2006/main">
   <p:cSld>
     <p:spTree>
@@ -12583,7 +13980,7 @@
                 <a:effectLst/>
                 <a:latin typeface="-apple-system"/>
               </a:rPr>
-              <a:t>Data </a:t>
+              <a:t>Data description and </a:t>
             </a:r>
             <a:r>
               <a:rPr lang="en-GB" sz="2400" b="1" noProof="0" dirty="0">
@@ -12622,7 +14019,7 @@
         <p:spPr>
           <a:xfrm>
             <a:off x="2445174" y="3982197"/>
-            <a:ext cx="2880360" cy="1477328"/>
+            <a:ext cx="2880360" cy="2031325"/>
           </a:xfrm>
           <a:prstGeom prst="rect">
             <a:avLst/>
@@ -12673,10 +14070,41 @@
                 </a:solidFill>
                 <a:latin typeface="-apple-system"/>
               </a:rPr>
-              <a:t> Remove low variance rows</a:t>
-            </a:r>
-          </a:p>
-          <a:p>
+              <a:t> Remove low variance rows                                   </a:t>
+            </a:r>
+          </a:p>
+          <a:p>
+            <a:pPr>
+              <a:buFont typeface="Arial" panose="020B0604020202020204" pitchFamily="34" charset="0"/>
+              <a:buChar char="•"/>
+            </a:pPr>
+            <a:endParaRPr lang="en-GB" dirty="0">
+              <a:solidFill>
+                <a:srgbClr val="1F2328"/>
+              </a:solidFill>
+              <a:latin typeface="-apple-system"/>
+            </a:endParaRPr>
+          </a:p>
+          <a:p>
+            <a:pPr>
+              <a:buFont typeface="Arial" panose="020B0604020202020204" pitchFamily="34" charset="0"/>
+              <a:buChar char="•"/>
+            </a:pPr>
+            <a:r>
+              <a:rPr lang="en-GB" noProof="0" dirty="0">
+                <a:solidFill>
+                  <a:srgbClr val="1F2328"/>
+                </a:solidFill>
+                <a:latin typeface="-apple-system"/>
+              </a:rPr>
+              <a:t>Remove technical outliers</a:t>
+            </a:r>
+          </a:p>
+          <a:p>
+            <a:pPr>
+              <a:buFont typeface="Arial" panose="020B0604020202020204" pitchFamily="34" charset="0"/>
+              <a:buChar char="•"/>
+            </a:pPr>
             <a:endParaRPr lang="en-GB" noProof="0" dirty="0">
               <a:solidFill>
                 <a:srgbClr val="1F2328"/>
@@ -12690,14 +14118,20 @@
               <a:buChar char="•"/>
             </a:pPr>
             <a:r>
-              <a:rPr lang="en-GB" noProof="0" dirty="0">
+              <a:rPr lang="en-GB" dirty="0">
                 <a:solidFill>
                   <a:srgbClr val="1F2328"/>
                 </a:solidFill>
                 <a:latin typeface="-apple-system"/>
               </a:rPr>
-              <a:t> Remove technical outliers</a:t>
-            </a:r>
+              <a:t>Normalization</a:t>
+            </a:r>
+            <a:endParaRPr lang="en-GB" noProof="0" dirty="0">
+              <a:solidFill>
+                <a:srgbClr val="1F2328"/>
+              </a:solidFill>
+              <a:latin typeface="-apple-system"/>
+            </a:endParaRPr>
           </a:p>
         </p:txBody>
       </p:sp>
@@ -12752,7 +14186,7 @@
           <p:nvPr/>
         </p:nvPicPr>
         <p:blipFill>
-          <a:blip r:embed="rId2">
+          <a:blip r:embed="rId3">
             <a:extLst>
               <a:ext uri="{28A0092B-C50C-407E-A947-70E740481C1C}">
                 <a14:useLocalDpi xmlns:a14="http://schemas.microsoft.com/office/drawing/2010/main" val="0"/>
@@ -12848,7 +14282,7 @@
           <p:nvPr/>
         </p:nvPicPr>
         <p:blipFill>
-          <a:blip r:embed="rId3">
+          <a:blip r:embed="rId4">
             <a:extLst>
               <a:ext uri="{28A0092B-C50C-407E-A947-70E740481C1C}">
                 <a14:useLocalDpi xmlns:a14="http://schemas.microsoft.com/office/drawing/2010/main" val="0"/>
@@ -13386,6 +14820,55 @@
                       </p:childTnLst>
                     </p:cTn>
                   </p:par>
+                  <p:par>
+                    <p:cTn id="31" fill="hold">
+                      <p:stCondLst>
+                        <p:cond delay="indefinite"/>
+                      </p:stCondLst>
+                      <p:childTnLst>
+                        <p:par>
+                          <p:cTn id="32" fill="hold">
+                            <p:stCondLst>
+                              <p:cond delay="0"/>
+                            </p:stCondLst>
+                            <p:childTnLst>
+                              <p:par>
+                                <p:cTn id="33" presetID="1" presetClass="entr" presetSubtype="0" fill="hold" nodeType="clickEffect">
+                                  <p:stCondLst>
+                                    <p:cond delay="0"/>
+                                  </p:stCondLst>
+                                  <p:childTnLst>
+                                    <p:set>
+                                      <p:cBhvr>
+                                        <p:cTn id="34" dur="1" fill="hold">
+                                          <p:stCondLst>
+                                            <p:cond delay="0"/>
+                                          </p:stCondLst>
+                                        </p:cTn>
+                                        <p:tgtEl>
+                                          <p:spTgt spid="9">
+                                            <p:txEl>
+                                              <p:pRg st="6" end="6"/>
+                                            </p:txEl>
+                                          </p:spTgt>
+                                        </p:tgtEl>
+                                        <p:attrNameLst>
+                                          <p:attrName>style.visibility</p:attrName>
+                                        </p:attrNameLst>
+                                      </p:cBhvr>
+                                      <p:to>
+                                        <p:strVal val="visible"/>
+                                      </p:to>
+                                    </p:set>
+                                  </p:childTnLst>
+                                </p:cTn>
+                              </p:par>
+                            </p:childTnLst>
+                          </p:cTn>
+                        </p:par>
+                      </p:childTnLst>
+                    </p:cTn>
+                  </p:par>
                 </p:childTnLst>
               </p:cTn>
               <p:prevCondLst>
@@ -13635,7 +15118,7 @@
                 </a:solidFill>
                 <a:latin typeface="-apple-system"/>
               </a:rPr>
-              <a:t>Proportion test</a:t>
+              <a:t> Proportion test</a:t>
             </a:r>
           </a:p>
         </p:txBody>
@@ -13691,7 +15174,7 @@
           <p:nvPr/>
         </p:nvPicPr>
         <p:blipFill>
-          <a:blip r:embed="rId2">
+          <a:blip r:embed="rId3">
             <a:extLst>
               <a:ext uri="{28A0092B-C50C-407E-A947-70E740481C1C}">
                 <a14:useLocalDpi xmlns:a14="http://schemas.microsoft.com/office/drawing/2010/main" val="0"/>
@@ -13914,7 +15397,7 @@
           <p:nvPr/>
         </p:nvPicPr>
         <p:blipFill>
-          <a:blip r:embed="rId3">
+          <a:blip r:embed="rId4">
             <a:extLst>
               <a:ext uri="{28A0092B-C50C-407E-A947-70E740481C1C}">
                 <a14:useLocalDpi xmlns:a14="http://schemas.microsoft.com/office/drawing/2010/main" val="0"/>
@@ -13928,42 +15411,6 @@
           <a:xfrm>
             <a:off x="6017678" y="1651000"/>
             <a:ext cx="5789455" cy="4256282"/>
-          </a:xfrm>
-          <a:prstGeom prst="rect">
-            <a:avLst/>
-          </a:prstGeom>
-        </p:spPr>
-      </p:pic>
-      <p:pic>
-        <p:nvPicPr>
-          <p:cNvPr id="10" name="Picture 9" descr="A blue screen with black text&#10;&#10;AI-generated content may be incorrect.">
-            <a:extLst>
-              <a:ext uri="{FF2B5EF4-FFF2-40B4-BE49-F238E27FC236}">
-                <a16:creationId xmlns:a16="http://schemas.microsoft.com/office/drawing/2014/main" id="{C6A6EDF5-5A94-3215-64CE-13024C5DEDAD}"/>
-              </a:ext>
-            </a:extLst>
-          </p:cNvPr>
-          <p:cNvPicPr>
-            <a:picLocks noChangeAspect="1"/>
-          </p:cNvPicPr>
-          <p:nvPr/>
-        </p:nvPicPr>
-        <p:blipFill>
-          <a:blip r:embed="rId4">
-            <a:extLst>
-              <a:ext uri="{28A0092B-C50C-407E-A947-70E740481C1C}">
-                <a14:useLocalDpi xmlns:a14="http://schemas.microsoft.com/office/drawing/2010/main" val="0"/>
-              </a:ext>
-            </a:extLst>
-          </a:blip>
-          <a:stretch>
-            <a:fillRect/>
-          </a:stretch>
-        </p:blipFill>
-        <p:spPr>
-          <a:xfrm>
-            <a:off x="6017677" y="1651000"/>
-            <a:ext cx="5789455" cy="4347031"/>
           </a:xfrm>
           <a:prstGeom prst="rect">
             <a:avLst/>
@@ -14304,7 +15751,7 @@
                             </p:stCondLst>
                             <p:childTnLst>
                               <p:par>
-                                <p:cTn id="23" presetID="1" presetClass="entr" presetSubtype="0" fill="hold" nodeType="clickEffect">
+                                <p:cTn id="23" presetID="1" presetClass="entr" presetSubtype="0" fill="hold" grpId="0" nodeType="clickEffect">
                                   <p:stCondLst>
                                     <p:cond delay="0"/>
                                   </p:stCondLst>
@@ -14312,55 +15759,6 @@
                                     <p:set>
                                       <p:cBhvr>
                                         <p:cTn id="24" dur="1" fill="hold">
-                                          <p:stCondLst>
-                                            <p:cond delay="0"/>
-                                          </p:stCondLst>
-                                        </p:cTn>
-                                        <p:tgtEl>
-                                          <p:spTgt spid="9">
-                                            <p:txEl>
-                                              <p:pRg st="4" end="4"/>
-                                            </p:txEl>
-                                          </p:spTgt>
-                                        </p:tgtEl>
-                                        <p:attrNameLst>
-                                          <p:attrName>style.visibility</p:attrName>
-                                        </p:attrNameLst>
-                                      </p:cBhvr>
-                                      <p:to>
-                                        <p:strVal val="visible"/>
-                                      </p:to>
-                                    </p:set>
-                                  </p:childTnLst>
-                                </p:cTn>
-                              </p:par>
-                            </p:childTnLst>
-                          </p:cTn>
-                        </p:par>
-                      </p:childTnLst>
-                    </p:cTn>
-                  </p:par>
-                  <p:par>
-                    <p:cTn id="25" fill="hold">
-                      <p:stCondLst>
-                        <p:cond delay="indefinite"/>
-                      </p:stCondLst>
-                      <p:childTnLst>
-                        <p:par>
-                          <p:cTn id="26" fill="hold">
-                            <p:stCondLst>
-                              <p:cond delay="0"/>
-                            </p:stCondLst>
-                            <p:childTnLst>
-                              <p:par>
-                                <p:cTn id="27" presetID="1" presetClass="entr" presetSubtype="0" fill="hold" grpId="0" nodeType="clickEffect">
-                                  <p:stCondLst>
-                                    <p:cond delay="0"/>
-                                  </p:stCondLst>
-                                  <p:childTnLst>
-                                    <p:set>
-                                      <p:cBhvr>
-                                        <p:cTn id="28" dur="1" fill="hold">
                                           <p:stCondLst>
                                             <p:cond delay="0"/>
                                           </p:stCondLst>
@@ -14380,14 +15778,14 @@
                                 </p:cTn>
                               </p:par>
                               <p:par>
-                                <p:cTn id="29" presetID="1" presetClass="entr" presetSubtype="0" fill="hold" grpId="0" nodeType="withEffect">
+                                <p:cTn id="25" presetID="1" presetClass="entr" presetSubtype="0" fill="hold" grpId="0" nodeType="withEffect">
                                   <p:stCondLst>
                                     <p:cond delay="0"/>
                                   </p:stCondLst>
                                   <p:childTnLst>
                                     <p:set>
                                       <p:cBhvr>
-                                        <p:cTn id="30" dur="1" fill="hold">
+                                        <p:cTn id="26" dur="1" fill="hold">
                                           <p:stCondLst>
                                             <p:cond delay="0"/>
                                           </p:stCondLst>
@@ -14407,14 +15805,14 @@
                                 </p:cTn>
                               </p:par>
                               <p:par>
-                                <p:cTn id="31" presetID="1" presetClass="entr" presetSubtype="0" fill="hold" nodeType="withEffect">
+                                <p:cTn id="27" presetID="1" presetClass="entr" presetSubtype="0" fill="hold" nodeType="withEffect">
                                   <p:stCondLst>
                                     <p:cond delay="0"/>
                                   </p:stCondLst>
                                   <p:childTnLst>
                                     <p:set>
                                       <p:cBhvr>
-                                        <p:cTn id="32" dur="1" fill="hold">
+                                        <p:cTn id="28" dur="1" fill="hold">
                                           <p:stCondLst>
                                             <p:cond delay="0"/>
                                           </p:stCondLst>
@@ -14440,32 +15838,36 @@
                     </p:cTn>
                   </p:par>
                   <p:par>
-                    <p:cTn id="33" fill="hold">
+                    <p:cTn id="29" fill="hold">
                       <p:stCondLst>
                         <p:cond delay="indefinite"/>
                       </p:stCondLst>
                       <p:childTnLst>
                         <p:par>
-                          <p:cTn id="34" fill="hold">
+                          <p:cTn id="30" fill="hold">
                             <p:stCondLst>
                               <p:cond delay="0"/>
                             </p:stCondLst>
                             <p:childTnLst>
                               <p:par>
-                                <p:cTn id="35" presetID="1" presetClass="entr" presetSubtype="0" fill="hold" nodeType="clickEffect">
+                                <p:cTn id="31" presetID="1" presetClass="entr" presetSubtype="0" fill="hold" nodeType="clickEffect">
                                   <p:stCondLst>
                                     <p:cond delay="0"/>
                                   </p:stCondLst>
                                   <p:childTnLst>
                                     <p:set>
                                       <p:cBhvr>
-                                        <p:cTn id="36" dur="1" fill="hold">
+                                        <p:cTn id="32" dur="1" fill="hold">
                                           <p:stCondLst>
                                             <p:cond delay="0"/>
                                           </p:stCondLst>
                                         </p:cTn>
                                         <p:tgtEl>
-                                          <p:spTgt spid="10"/>
+                                          <p:spTgt spid="9">
+                                            <p:txEl>
+                                              <p:pRg st="4" end="4"/>
+                                            </p:txEl>
+                                          </p:spTgt>
                                         </p:tgtEl>
                                         <p:attrNameLst>
                                           <p:attrName>style.visibility</p:attrName>

</xml_diff>

<commit_message>
Versuch vom Proportion test
</commit_message>
<xml_diff>
--- a/Project Proposal.pptx
+++ b/Project Proposal.pptx
@@ -215,7 +215,7 @@
           <a:p>
             <a:fld id="{F3DC1176-C79C-4333-88B3-BCEA525AFE9D}" type="datetimeFigureOut">
               <a:rPr lang="de-DE" smtClean="0"/>
-              <a:t>13.05.2025</a:t>
+              <a:t>09.06.2025</a:t>
             </a:fld>
             <a:endParaRPr lang="de-DE"/>
           </a:p>
@@ -373,7 +373,7 @@
           <a:p>
             <a:fld id="{5CE5EABD-9B00-4D4A-AB75-54D2757912B9}" type="slidenum">
               <a:rPr lang="de-DE" smtClean="0"/>
-              <a:t>‹Nr.›</a:t>
+              <a:t>‹#›</a:t>
             </a:fld>
             <a:endParaRPr lang="de-DE"/>
           </a:p>
@@ -3172,7 +3172,7 @@
           <a:p>
             <a:fld id="{AEE46315-4AAD-410B-89FA-21C15CCB14A3}" type="datetimeFigureOut">
               <a:rPr lang="de-DE" smtClean="0"/>
-              <a:t>13.05.2025</a:t>
+              <a:t>09.06.2025</a:t>
             </a:fld>
             <a:endParaRPr lang="de-DE"/>
           </a:p>
@@ -3226,7 +3226,7 @@
           <a:p>
             <a:fld id="{76CD8E94-8180-4651-B6B5-5A5ABA3C85A7}" type="slidenum">
               <a:rPr lang="de-DE" smtClean="0"/>
-              <a:t>‹Nr.›</a:t>
+              <a:t>‹#›</a:t>
             </a:fld>
             <a:endParaRPr lang="de-DE"/>
           </a:p>
@@ -3372,7 +3372,7 @@
           <a:p>
             <a:fld id="{AEE46315-4AAD-410B-89FA-21C15CCB14A3}" type="datetimeFigureOut">
               <a:rPr lang="de-DE" smtClean="0"/>
-              <a:t>13.05.2025</a:t>
+              <a:t>09.06.2025</a:t>
             </a:fld>
             <a:endParaRPr lang="de-DE"/>
           </a:p>
@@ -3426,7 +3426,7 @@
           <a:p>
             <a:fld id="{76CD8E94-8180-4651-B6B5-5A5ABA3C85A7}" type="slidenum">
               <a:rPr lang="de-DE" smtClean="0"/>
-              <a:t>‹Nr.›</a:t>
+              <a:t>‹#›</a:t>
             </a:fld>
             <a:endParaRPr lang="de-DE"/>
           </a:p>
@@ -3582,7 +3582,7 @@
           <a:p>
             <a:fld id="{AEE46315-4AAD-410B-89FA-21C15CCB14A3}" type="datetimeFigureOut">
               <a:rPr lang="de-DE" smtClean="0"/>
-              <a:t>13.05.2025</a:t>
+              <a:t>09.06.2025</a:t>
             </a:fld>
             <a:endParaRPr lang="de-DE"/>
           </a:p>
@@ -3636,7 +3636,7 @@
           <a:p>
             <a:fld id="{76CD8E94-8180-4651-B6B5-5A5ABA3C85A7}" type="slidenum">
               <a:rPr lang="de-DE" smtClean="0"/>
-              <a:t>‹Nr.›</a:t>
+              <a:t>‹#›</a:t>
             </a:fld>
             <a:endParaRPr lang="de-DE"/>
           </a:p>
@@ -3782,7 +3782,7 @@
           <a:p>
             <a:fld id="{AEE46315-4AAD-410B-89FA-21C15CCB14A3}" type="datetimeFigureOut">
               <a:rPr lang="de-DE" smtClean="0"/>
-              <a:t>13.05.2025</a:t>
+              <a:t>09.06.2025</a:t>
             </a:fld>
             <a:endParaRPr lang="de-DE"/>
           </a:p>
@@ -3836,7 +3836,7 @@
           <a:p>
             <a:fld id="{76CD8E94-8180-4651-B6B5-5A5ABA3C85A7}" type="slidenum">
               <a:rPr lang="de-DE" smtClean="0"/>
-              <a:t>‹Nr.›</a:t>
+              <a:t>‹#›</a:t>
             </a:fld>
             <a:endParaRPr lang="de-DE"/>
           </a:p>
@@ -4058,7 +4058,7 @@
           <a:p>
             <a:fld id="{AEE46315-4AAD-410B-89FA-21C15CCB14A3}" type="datetimeFigureOut">
               <a:rPr lang="de-DE" smtClean="0"/>
-              <a:t>13.05.2025</a:t>
+              <a:t>09.06.2025</a:t>
             </a:fld>
             <a:endParaRPr lang="de-DE"/>
           </a:p>
@@ -4112,7 +4112,7 @@
           <a:p>
             <a:fld id="{76CD8E94-8180-4651-B6B5-5A5ABA3C85A7}" type="slidenum">
               <a:rPr lang="de-DE" smtClean="0"/>
-              <a:t>‹Nr.›</a:t>
+              <a:t>‹#›</a:t>
             </a:fld>
             <a:endParaRPr lang="de-DE"/>
           </a:p>
@@ -4326,7 +4326,7 @@
           <a:p>
             <a:fld id="{AEE46315-4AAD-410B-89FA-21C15CCB14A3}" type="datetimeFigureOut">
               <a:rPr lang="de-DE" smtClean="0"/>
-              <a:t>13.05.2025</a:t>
+              <a:t>09.06.2025</a:t>
             </a:fld>
             <a:endParaRPr lang="de-DE"/>
           </a:p>
@@ -4380,7 +4380,7 @@
           <a:p>
             <a:fld id="{76CD8E94-8180-4651-B6B5-5A5ABA3C85A7}" type="slidenum">
               <a:rPr lang="de-DE" smtClean="0"/>
-              <a:t>‹Nr.›</a:t>
+              <a:t>‹#›</a:t>
             </a:fld>
             <a:endParaRPr lang="de-DE"/>
           </a:p>
@@ -4741,7 +4741,7 @@
           <a:p>
             <a:fld id="{AEE46315-4AAD-410B-89FA-21C15CCB14A3}" type="datetimeFigureOut">
               <a:rPr lang="de-DE" smtClean="0"/>
-              <a:t>13.05.2025</a:t>
+              <a:t>09.06.2025</a:t>
             </a:fld>
             <a:endParaRPr lang="de-DE"/>
           </a:p>
@@ -4795,7 +4795,7 @@
           <a:p>
             <a:fld id="{76CD8E94-8180-4651-B6B5-5A5ABA3C85A7}" type="slidenum">
               <a:rPr lang="de-DE" smtClean="0"/>
-              <a:t>‹Nr.›</a:t>
+              <a:t>‹#›</a:t>
             </a:fld>
             <a:endParaRPr lang="de-DE"/>
           </a:p>
@@ -4883,7 +4883,7 @@
           <a:p>
             <a:fld id="{AEE46315-4AAD-410B-89FA-21C15CCB14A3}" type="datetimeFigureOut">
               <a:rPr lang="de-DE" smtClean="0"/>
-              <a:t>13.05.2025</a:t>
+              <a:t>09.06.2025</a:t>
             </a:fld>
             <a:endParaRPr lang="de-DE"/>
           </a:p>
@@ -4937,7 +4937,7 @@
           <a:p>
             <a:fld id="{76CD8E94-8180-4651-B6B5-5A5ABA3C85A7}" type="slidenum">
               <a:rPr lang="de-DE" smtClean="0"/>
-              <a:t>‹Nr.›</a:t>
+              <a:t>‹#›</a:t>
             </a:fld>
             <a:endParaRPr lang="de-DE"/>
           </a:p>
@@ -4996,7 +4996,7 @@
           <a:p>
             <a:fld id="{AEE46315-4AAD-410B-89FA-21C15CCB14A3}" type="datetimeFigureOut">
               <a:rPr lang="de-DE" smtClean="0"/>
-              <a:t>13.05.2025</a:t>
+              <a:t>09.06.2025</a:t>
             </a:fld>
             <a:endParaRPr lang="de-DE"/>
           </a:p>
@@ -5050,7 +5050,7 @@
           <a:p>
             <a:fld id="{76CD8E94-8180-4651-B6B5-5A5ABA3C85A7}" type="slidenum">
               <a:rPr lang="de-DE" smtClean="0"/>
-              <a:t>‹Nr.›</a:t>
+              <a:t>‹#›</a:t>
             </a:fld>
             <a:endParaRPr lang="de-DE"/>
           </a:p>
@@ -5309,7 +5309,7 @@
           <a:p>
             <a:fld id="{AEE46315-4AAD-410B-89FA-21C15CCB14A3}" type="datetimeFigureOut">
               <a:rPr lang="de-DE" smtClean="0"/>
-              <a:t>13.05.2025</a:t>
+              <a:t>09.06.2025</a:t>
             </a:fld>
             <a:endParaRPr lang="de-DE"/>
           </a:p>
@@ -5363,7 +5363,7 @@
           <a:p>
             <a:fld id="{76CD8E94-8180-4651-B6B5-5A5ABA3C85A7}" type="slidenum">
               <a:rPr lang="de-DE" smtClean="0"/>
-              <a:t>‹Nr.›</a:t>
+              <a:t>‹#›</a:t>
             </a:fld>
             <a:endParaRPr lang="de-DE"/>
           </a:p>
@@ -5598,7 +5598,7 @@
           <a:p>
             <a:fld id="{AEE46315-4AAD-410B-89FA-21C15CCB14A3}" type="datetimeFigureOut">
               <a:rPr lang="de-DE" smtClean="0"/>
-              <a:t>13.05.2025</a:t>
+              <a:t>09.06.2025</a:t>
             </a:fld>
             <a:endParaRPr lang="de-DE"/>
           </a:p>
@@ -5652,7 +5652,7 @@
           <a:p>
             <a:fld id="{76CD8E94-8180-4651-B6B5-5A5ABA3C85A7}" type="slidenum">
               <a:rPr lang="de-DE" smtClean="0"/>
-              <a:t>‹Nr.›</a:t>
+              <a:t>‹#›</a:t>
             </a:fld>
             <a:endParaRPr lang="de-DE"/>
           </a:p>
@@ -5841,7 +5841,7 @@
           <a:p>
             <a:fld id="{AEE46315-4AAD-410B-89FA-21C15CCB14A3}" type="datetimeFigureOut">
               <a:rPr lang="de-DE" smtClean="0"/>
-              <a:t>13.05.2025</a:t>
+              <a:t>09.06.2025</a:t>
             </a:fld>
             <a:endParaRPr lang="de-DE"/>
           </a:p>
@@ -5931,7 +5931,7 @@
           <a:p>
             <a:fld id="{76CD8E94-8180-4651-B6B5-5A5ABA3C85A7}" type="slidenum">
               <a:rPr lang="de-DE" smtClean="0"/>
-              <a:t>‹Nr.›</a:t>
+              <a:t>‹#›</a:t>
             </a:fld>
             <a:endParaRPr lang="de-DE"/>
           </a:p>

</xml_diff>